<commit_message>
home dashboard with consistent visualization impelemented
</commit_message>
<xml_diff>
--- a/presentations/TellCo_Analysis_Interim.pptx
+++ b/presentations/TellCo_Analysis_Interim.pptx
@@ -10,9 +10,6 @@
     <p:sldId id="258" r:id="rId9"/>
     <p:sldId id="259" r:id="rId10"/>
     <p:sldId id="260" r:id="rId11"/>
-    <p:sldId id="261" r:id="rId12"/>
-    <p:sldId id="262" r:id="rId13"/>
-    <p:sldId id="263" r:id="rId14"/>
   </p:sldIdLst>
   <p:sldSz cx="9144000" cy="6858000" type="screen4x3"/>
   <p:notesSz cx="6858000" cy="9144000"/>
@@ -3132,7 +3129,7 @@
           <a:lstStyle/>
           <a:p>
             <a:r>
-              <a:t>Interim Analysis Results</a:t>
+              <a:t>Interim Findings</a:t>
             </a:r>
           </a:p>
         </p:txBody>
@@ -3171,19 +3168,19 @@
           <a:lstStyle/>
           <a:p>
             <a:r>
-              <a:t>Task 1: User Overview Analysis</a:t>
-            </a:r>
-          </a:p>
-        </p:txBody>
-      </p:sp>
-      <p:sp>
-        <p:nvSpPr>
-          <p:cNvPr id="3" name="Text Placeholder 2"/>
-          <p:cNvSpPr>
-            <a:spLocks noGrp="1"/>
-          </p:cNvSpPr>
-          <p:nvPr>
-            <p:ph type="body" idx="1"/>
+              <a:t>Key Findings and Growth Opportunities</a:t>
+            </a:r>
+          </a:p>
+        </p:txBody>
+      </p:sp>
+      <p:sp>
+        <p:nvSpPr>
+          <p:cNvPr id="3" name="Content Placeholder 2"/>
+          <p:cNvSpPr>
+            <a:spLocks noGrp="1"/>
+          </p:cNvSpPr>
+          <p:nvPr>
+            <p:ph idx="1"/>
           </p:nvPr>
         </p:nvSpPr>
         <p:spPr/>
@@ -3191,6 +3188,36 @@
           <a:bodyPr/>
           <a:lstStyle/>
           <a:p/>
+          <a:p>
+            <a:pPr/>
+            <a:r>
+              <a:t>High-end smartphones dominate usage</a:t>
+            </a:r>
+          </a:p>
+          <a:p>
+            <a:pPr/>
+            <a:r>
+              <a:t>Social media and video streaming drive engagement</a:t>
+            </a:r>
+          </a:p>
+          <a:p>
+            <a:pPr/>
+            <a:r>
+              <a:t>Gaming apps show growing usage</a:t>
+            </a:r>
+          </a:p>
+          <a:p>
+            <a:pPr/>
+            <a:r>
+              <a:t>Premium users are key demographic for growth</a:t>
+            </a:r>
+          </a:p>
+          <a:p>
+            <a:pPr/>
+            <a:r>
+              <a:t>Network optimization opportunities identified</a:t>
+            </a:r>
+          </a:p>
         </p:txBody>
       </p:sp>
     </p:spTree>
@@ -3227,7 +3254,7 @@
           <a:lstStyle/>
           <a:p>
             <a:r>
-              <a:t>Top 10 Handsets</a:t>
+              <a:t>Device Preferences</a:t>
             </a:r>
           </a:p>
         </p:txBody>
@@ -3250,31 +3277,25 @@
           <a:p>
             <a:pPr/>
             <a:r>
-              <a:t>Most popular handset: Huawei B528S-23A</a:t>
+              <a:t>Top handsets dominated by premium devices</a:t>
             </a:r>
           </a:p>
           <a:p>
             <a:pPr/>
             <a:r>
-              <a:t>Second most popular: Apple iPhone 6S (A1688)</a:t>
+              <a:t>Apple leads manufacturer market share</a:t>
             </a:r>
           </a:p>
           <a:p>
             <a:pPr/>
             <a:r>
-              <a:t>Third most popular: Apple iPhone 6 (A1586)</a:t>
+              <a:t>High-end devices show increased data usage</a:t>
             </a:r>
           </a:p>
           <a:p>
             <a:pPr/>
             <a:r>
-              <a:t>Apple devices dominate the top 10 list</a:t>
-            </a:r>
-          </a:p>
-          <a:p>
-            <a:pPr/>
-            <a:r>
-              <a:t>High-end smartphones are preferred by users</a:t>
+              <a:t>Opportunity for targeted premium services</a:t>
             </a:r>
           </a:p>
         </p:txBody>
@@ -3313,7 +3334,7 @@
           <a:lstStyle/>
           <a:p>
             <a:r>
-              <a:t>Top Manufacturers</a:t>
+              <a:t>User Engagement Insights</a:t>
             </a:r>
           </a:p>
         </p:txBody>
@@ -3336,31 +3357,25 @@
           <a:p>
             <a:pPr/>
             <a:r>
-              <a:t>Leading manufacturer: Apple</a:t>
+              <a:t>Peak usage patterns identified in evening hours</a:t>
             </a:r>
           </a:p>
           <a:p>
             <a:pPr/>
             <a:r>
-              <a:t>Second place: Samsung</a:t>
+              <a:t>Social media drives majority of traffic</a:t>
             </a:r>
           </a:p>
           <a:p>
             <a:pPr/>
             <a:r>
-              <a:t>Third place: Huawei</a:t>
+              <a:t>Video streaming shows high engagement</a:t>
             </a:r>
           </a:p>
           <a:p>
             <a:pPr/>
             <a:r>
-              <a:t>Market is dominated by three major manufacturers</a:t>
-            </a:r>
-          </a:p>
-          <a:p>
-            <a:pPr/>
-            <a:r>
-              <a:t>Opportunity for market diversification</a:t>
+              <a:t>Gaming emerges as growth segment</a:t>
             </a:r>
           </a:p>
         </p:txBody>
@@ -3399,19 +3414,19 @@
           <a:lstStyle/>
           <a:p>
             <a:r>
-              <a:t>Task 2: User Engagement Analysis</a:t>
-            </a:r>
-          </a:p>
-        </p:txBody>
-      </p:sp>
-      <p:sp>
-        <p:nvSpPr>
-          <p:cNvPr id="3" name="Text Placeholder 2"/>
-          <p:cNvSpPr>
-            <a:spLocks noGrp="1"/>
-          </p:cNvSpPr>
-          <p:nvPr>
-            <p:ph type="body" idx="1"/>
+              <a:t>Recommendations</a:t>
+            </a:r>
+          </a:p>
+        </p:txBody>
+      </p:sp>
+      <p:sp>
+        <p:nvSpPr>
+          <p:cNvPr id="3" name="Content Placeholder 2"/>
+          <p:cNvSpPr>
+            <a:spLocks noGrp="1"/>
+          </p:cNvSpPr>
+          <p:nvPr>
+            <p:ph idx="1"/>
           </p:nvPr>
         </p:nvSpPr>
         <p:spPr/>
@@ -3419,262 +3434,34 @@
           <a:bodyPr/>
           <a:lstStyle/>
           <a:p/>
-        </p:txBody>
-      </p:sp>
-    </p:spTree>
-  </p:cSld>
-  <p:clrMapOvr>
-    <a:masterClrMapping/>
-  </p:clrMapOvr>
-</p:sld>
-</file>
-
-<file path=ppt/slides/slide6.xml><?xml version="1.0" encoding="utf-8"?>
-<p:sld xmlns:a="http://schemas.openxmlformats.org/drawingml/2006/main" xmlns:p="http://schemas.openxmlformats.org/presentationml/2006/main" xmlns:r="http://schemas.openxmlformats.org/officeDocument/2006/relationships">
-  <p:cSld>
-    <p:spTree>
-      <p:nvGrpSpPr>
-        <p:cNvPr id="1" name=""/>
-        <p:cNvGrpSpPr/>
-        <p:nvPr/>
-      </p:nvGrpSpPr>
-      <p:grpSpPr/>
-      <p:sp>
-        <p:nvSpPr>
-          <p:cNvPr id="2" name="Title 1"/>
-          <p:cNvSpPr>
-            <a:spLocks noGrp="1"/>
-          </p:cNvSpPr>
-          <p:nvPr>
-            <p:ph type="title"/>
-          </p:nvPr>
-        </p:nvSpPr>
-        <p:spPr/>
-        <p:txBody>
-          <a:bodyPr/>
-          <a:lstStyle/>
-          <a:p>
-            <a:r>
-              <a:t>User Engagement Patterns</a:t>
-            </a:r>
-          </a:p>
-        </p:txBody>
-      </p:sp>
-      <p:sp>
-        <p:nvSpPr>
-          <p:cNvPr id="3" name="Content Placeholder 2"/>
-          <p:cNvSpPr>
-            <a:spLocks noGrp="1"/>
-          </p:cNvSpPr>
-          <p:nvPr>
-            <p:ph idx="1"/>
-          </p:nvPr>
-        </p:nvSpPr>
-        <p:spPr/>
-        <p:txBody>
-          <a:bodyPr/>
-          <a:lstStyle/>
-          <a:p/>
           <a:p>
             <a:pPr/>
             <a:r>
-              <a:t>Most active users show consistent engagement</a:t>
+              <a:t>Focus on premium smartphone users</a:t>
             </a:r>
           </a:p>
           <a:p>
             <a:pPr/>
             <a:r>
-              <a:t>Session durations vary significantly</a:t>
+              <a:t>Optimize network for video streaming</a:t>
             </a:r>
           </a:p>
           <a:p>
             <a:pPr/>
             <a:r>
-              <a:t>Peak usage during specific times</a:t>
+              <a:t>Partner with top manufacturers</a:t>
             </a:r>
           </a:p>
           <a:p>
             <a:pPr/>
             <a:r>
-              <a:t>Clear patterns in data consumption</a:t>
+              <a:t>Develop targeted marketing campaigns</a:t>
             </a:r>
           </a:p>
           <a:p>
             <a:pPr/>
             <a:r>
-              <a:t>Varied application preferences</a:t>
-            </a:r>
-          </a:p>
-        </p:txBody>
-      </p:sp>
-    </p:spTree>
-  </p:cSld>
-  <p:clrMapOvr>
-    <a:masterClrMapping/>
-  </p:clrMapOvr>
-</p:sld>
-</file>
-
-<file path=ppt/slides/slide7.xml><?xml version="1.0" encoding="utf-8"?>
-<p:sld xmlns:a="http://schemas.openxmlformats.org/drawingml/2006/main" xmlns:p="http://schemas.openxmlformats.org/presentationml/2006/main" xmlns:r="http://schemas.openxmlformats.org/officeDocument/2006/relationships">
-  <p:cSld>
-    <p:spTree>
-      <p:nvGrpSpPr>
-        <p:cNvPr id="1" name=""/>
-        <p:cNvGrpSpPr/>
-        <p:nvPr/>
-      </p:nvGrpSpPr>
-      <p:grpSpPr/>
-      <p:sp>
-        <p:nvSpPr>
-          <p:cNvPr id="2" name="Title 1"/>
-          <p:cNvSpPr>
-            <a:spLocks noGrp="1"/>
-          </p:cNvSpPr>
-          <p:nvPr>
-            <p:ph type="title"/>
-          </p:nvPr>
-        </p:nvSpPr>
-        <p:spPr/>
-        <p:txBody>
-          <a:bodyPr/>
-          <a:lstStyle/>
-          <a:p>
-            <a:r>
-              <a:t>Application Usage Analysis</a:t>
-            </a:r>
-          </a:p>
-        </p:txBody>
-      </p:sp>
-      <p:sp>
-        <p:nvSpPr>
-          <p:cNvPr id="3" name="Content Placeholder 2"/>
-          <p:cNvSpPr>
-            <a:spLocks noGrp="1"/>
-          </p:cNvSpPr>
-          <p:nvPr>
-            <p:ph idx="1"/>
-          </p:nvPr>
-        </p:nvSpPr>
-        <p:spPr/>
-        <p:txBody>
-          <a:bodyPr/>
-          <a:lstStyle/>
-          <a:p/>
-          <a:p>
-            <a:pPr/>
-            <a:r>
-              <a:t>Social media leads in user engagement</a:t>
-            </a:r>
-          </a:p>
-          <a:p>
-            <a:pPr/>
-            <a:r>
-              <a:t>Video streaming shows significant traffic</a:t>
-            </a:r>
-          </a:p>
-          <a:p>
-            <a:pPr/>
-            <a:r>
-              <a:t>Gaming applications show growing usage</a:t>
-            </a:r>
-          </a:p>
-          <a:p>
-            <a:pPr/>
-            <a:r>
-              <a:t>Email remains a steady traffic source</a:t>
-            </a:r>
-          </a:p>
-          <a:p>
-            <a:pPr/>
-            <a:r>
-              <a:t>Opportunities for targeted service improvements</a:t>
-            </a:r>
-          </a:p>
-        </p:txBody>
-      </p:sp>
-    </p:spTree>
-  </p:cSld>
-  <p:clrMapOvr>
-    <a:masterClrMapping/>
-  </p:clrMapOvr>
-</p:sld>
-</file>
-
-<file path=ppt/slides/slide8.xml><?xml version="1.0" encoding="utf-8"?>
-<p:sld xmlns:a="http://schemas.openxmlformats.org/drawingml/2006/main" xmlns:p="http://schemas.openxmlformats.org/presentationml/2006/main" xmlns:r="http://schemas.openxmlformats.org/officeDocument/2006/relationships">
-  <p:cSld>
-    <p:spTree>
-      <p:nvGrpSpPr>
-        <p:cNvPr id="1" name=""/>
-        <p:cNvGrpSpPr/>
-        <p:nvPr/>
-      </p:nvGrpSpPr>
-      <p:grpSpPr/>
-      <p:sp>
-        <p:nvSpPr>
-          <p:cNvPr id="2" name="Title 1"/>
-          <p:cNvSpPr>
-            <a:spLocks noGrp="1"/>
-          </p:cNvSpPr>
-          <p:nvPr>
-            <p:ph type="title"/>
-          </p:nvPr>
-        </p:nvSpPr>
-        <p:spPr/>
-        <p:txBody>
-          <a:bodyPr/>
-          <a:lstStyle/>
-          <a:p>
-            <a:r>
-              <a:t>Key Recommendations</a:t>
-            </a:r>
-          </a:p>
-        </p:txBody>
-      </p:sp>
-      <p:sp>
-        <p:nvSpPr>
-          <p:cNvPr id="3" name="Content Placeholder 2"/>
-          <p:cNvSpPr>
-            <a:spLocks noGrp="1"/>
-          </p:cNvSpPr>
-          <p:nvPr>
-            <p:ph idx="1"/>
-          </p:nvPr>
-        </p:nvSpPr>
-        <p:spPr/>
-        <p:txBody>
-          <a:bodyPr/>
-          <a:lstStyle/>
-          <a:p/>
-          <a:p>
-            <a:pPr/>
-            <a:r>
-              <a:t>Focus on premium smartphone users</a:t>
-            </a:r>
-          </a:p>
-          <a:p>
-            <a:pPr/>
-            <a:r>
-              <a:t>Optimize network for video streaming</a:t>
-            </a:r>
-          </a:p>
-          <a:p>
-            <a:pPr/>
-            <a:r>
-              <a:t>Consider partnerships with top manufacturers</a:t>
-            </a:r>
-          </a:p>
-          <a:p>
-            <a:pPr/>
-            <a:r>
-              <a:t>Implement targeted marketing strategies</a:t>
-            </a:r>
-          </a:p>
-          <a:p>
-            <a:pPr/>
-            <a:r>
-              <a:t>Enhance service quality for high-traffic applications</a:t>
+              <a:t>Implement user segmentation strategies</a:t>
             </a:r>
           </a:p>
         </p:txBody>

</xml_diff>